<commit_message>
Update menu and exports
</commit_message>
<xml_diff>
--- a/misc/Menu 24 by 36 on 12-12-24/1_DaBeast Services Menu.pptx
+++ b/misc/Menu 24 by 36 on 12-12-24/1_DaBeast Services Menu.pptx
@@ -11976,7 +11976,7 @@
         </p:nvSpPr>
         <p:spPr>
           <a:xfrm>
-            <a:off x="11204134" y="14035982"/>
+            <a:off x="11204134" y="13674477"/>
             <a:ext cx="10168200" cy="6698143"/>
           </a:xfrm>
           <a:prstGeom prst="roundRect">
@@ -12127,7 +12127,7 @@
         </p:nvSpPr>
         <p:spPr>
           <a:xfrm>
-            <a:off x="573151" y="6257975"/>
+            <a:off x="573151" y="5896470"/>
             <a:ext cx="10631100" cy="12307500"/>
           </a:xfrm>
           <a:prstGeom prst="rect">
@@ -12507,7 +12507,7 @@
         </p:nvSpPr>
         <p:spPr>
           <a:xfrm>
-            <a:off x="11393984" y="6257990"/>
+            <a:off x="11393984" y="5896485"/>
             <a:ext cx="9859200" cy="15674804"/>
           </a:xfrm>
           <a:prstGeom prst="rect">
@@ -13164,8 +13164,8 @@
         </p:nvSpPr>
         <p:spPr>
           <a:xfrm>
-            <a:off x="982914" y="20452646"/>
-            <a:ext cx="10221000" cy="7366500"/>
+            <a:off x="982914" y="20325056"/>
+            <a:ext cx="10221000" cy="6656951"/>
           </a:xfrm>
           <a:prstGeom prst="rect">
             <a:avLst/>
@@ -13191,7 +13191,7 @@
               <a:buNone/>
             </a:pPr>
             <a:r>
-              <a:rPr lang="en-US" sz="11800" b="1">
+              <a:rPr lang="en-US" sz="11800" b="1" dirty="0">
                 <a:solidFill>
                   <a:schemeClr val="lt1"/>
                 </a:solidFill>
@@ -13202,27 +13202,7 @@
               </a:rPr>
               <a:t>Desserts</a:t>
             </a:r>
-            <a:endParaRPr sz="7800" b="1">
-              <a:solidFill>
-                <a:schemeClr val="lt1"/>
-              </a:solidFill>
-              <a:latin typeface="Arial Narrow"/>
-              <a:ea typeface="Arial Narrow"/>
-              <a:cs typeface="Arial Narrow"/>
-              <a:sym typeface="Arial Narrow"/>
-            </a:endParaRPr>
-          </a:p>
-          <a:p>
-            <a:pPr marL="0" marR="0" lvl="0" indent="0" algn="l" rtl="0">
-              <a:spcBef>
-                <a:spcPts val="0"/>
-              </a:spcBef>
-              <a:spcAft>
-                <a:spcPts val="0"/>
-              </a:spcAft>
-              <a:buNone/>
-            </a:pPr>
-            <a:endParaRPr sz="4600">
+            <a:endParaRPr sz="7800" b="1" dirty="0">
               <a:solidFill>
                 <a:schemeClr val="lt1"/>
               </a:solidFill>
@@ -13247,7 +13227,7 @@
               <a:buFont typeface="Arial"/>
               <a:buNone/>
             </a:pPr>
-            <a:endParaRPr sz="5900">
+            <a:endParaRPr sz="5900" dirty="0">
               <a:solidFill>
                 <a:schemeClr val="lt1"/>
               </a:solidFill>
@@ -13273,7 +13253,7 @@
               <a:buChar char="•"/>
             </a:pPr>
             <a:r>
-              <a:rPr lang="en-US" sz="5900">
+              <a:rPr lang="en-US" sz="5900" dirty="0">
                 <a:solidFill>
                   <a:schemeClr val="lt1"/>
                 </a:solidFill>
@@ -13285,7 +13265,7 @@
               <a:t>Fried Oreos ……………….. </a:t>
             </a:r>
             <a:r>
-              <a:rPr lang="en-US" sz="5900" b="1">
+              <a:rPr lang="en-US" sz="5900" b="1" dirty="0">
                 <a:solidFill>
                   <a:srgbClr val="8CD872"/>
                 </a:solidFill>
@@ -13296,7 +13276,7 @@
               </a:rPr>
               <a:t>5</a:t>
             </a:r>
-            <a:endParaRPr sz="4600"/>
+            <a:endParaRPr sz="4600" dirty="0"/>
           </a:p>
           <a:p>
             <a:pPr marL="927100" marR="0" lvl="0" indent="-933450" algn="l" rtl="0">
@@ -13314,7 +13294,7 @@
               <a:buChar char="•"/>
             </a:pPr>
             <a:r>
-              <a:rPr lang="en-US" sz="5900">
+              <a:rPr lang="en-US" sz="5900" dirty="0">
                 <a:solidFill>
                   <a:schemeClr val="lt1"/>
                 </a:solidFill>
@@ -13326,7 +13306,7 @@
               <a:t>Fried Cheesecake Bites …. </a:t>
             </a:r>
             <a:r>
-              <a:rPr lang="en-US" sz="5900" b="1">
+              <a:rPr lang="en-US" sz="5900" b="1" dirty="0">
                 <a:solidFill>
                   <a:srgbClr val="8CD872"/>
                 </a:solidFill>
@@ -13337,7 +13317,7 @@
               </a:rPr>
               <a:t>6</a:t>
             </a:r>
-            <a:endParaRPr sz="4600"/>
+            <a:endParaRPr sz="4600" dirty="0"/>
           </a:p>
           <a:p>
             <a:pPr marL="927100" marR="0" lvl="0" indent="-933450" algn="l" rtl="0">
@@ -13355,7 +13335,7 @@
               <a:buChar char="•"/>
             </a:pPr>
             <a:r>
-              <a:rPr lang="en-US" sz="5900">
+              <a:rPr lang="en-US" sz="5900" dirty="0">
                 <a:solidFill>
                   <a:schemeClr val="lt1"/>
                 </a:solidFill>
@@ -13367,7 +13347,7 @@
               <a:t>Limber De Coco (Ice Cream) …………………………….… </a:t>
             </a:r>
             <a:r>
-              <a:rPr lang="en-US" sz="5900" b="1">
+              <a:rPr lang="en-US" sz="5900" b="1" dirty="0">
                 <a:solidFill>
                   <a:srgbClr val="8CD872"/>
                 </a:solidFill>
@@ -13378,7 +13358,7 @@
               </a:rPr>
               <a:t>5</a:t>
             </a:r>
-            <a:endParaRPr sz="4600" b="1">
+            <a:endParaRPr sz="4600" b="1" dirty="0">
               <a:solidFill>
                 <a:srgbClr val="8CD872"/>
               </a:solidFill>
@@ -13394,7 +13374,7 @@
         </p:nvCxnSpPr>
         <p:spPr>
           <a:xfrm>
-            <a:off x="497853" y="8522893"/>
+            <a:off x="497853" y="8161388"/>
             <a:ext cx="20755200" cy="0"/>
           </a:xfrm>
           <a:prstGeom prst="straightConnector1">
@@ -13420,7 +13400,7 @@
         </p:nvCxnSpPr>
         <p:spPr>
           <a:xfrm>
-            <a:off x="497853" y="22785060"/>
+            <a:off x="497853" y="22423555"/>
             <a:ext cx="20755200" cy="0"/>
           </a:xfrm>
           <a:prstGeom prst="straightConnector1">
@@ -13446,8 +13426,8 @@
         </p:nvSpPr>
         <p:spPr>
           <a:xfrm>
-            <a:off x="11416931" y="20452627"/>
-            <a:ext cx="9859200" cy="11304377"/>
+            <a:off x="11416931" y="20325037"/>
+            <a:ext cx="9859200" cy="10396436"/>
           </a:xfrm>
           <a:prstGeom prst="rect">
             <a:avLst/>
@@ -13485,26 +13465,6 @@
               <a:t>Beverages</a:t>
             </a:r>
             <a:endParaRPr sz="4600" dirty="0"/>
-          </a:p>
-          <a:p>
-            <a:pPr marL="0" marR="0" lvl="0" indent="0" algn="l" rtl="0">
-              <a:spcBef>
-                <a:spcPts val="0"/>
-              </a:spcBef>
-              <a:spcAft>
-                <a:spcPts val="0"/>
-              </a:spcAft>
-              <a:buNone/>
-            </a:pPr>
-            <a:endParaRPr sz="5900" dirty="0">
-              <a:solidFill>
-                <a:schemeClr val="lt1"/>
-              </a:solidFill>
-              <a:latin typeface="Arial Narrow"/>
-              <a:ea typeface="Arial Narrow"/>
-              <a:cs typeface="Arial Narrow"/>
-              <a:sym typeface="Arial Narrow"/>
-            </a:endParaRPr>
           </a:p>
           <a:p>
             <a:pPr marL="0" marR="0" lvl="0" indent="0" algn="l" rtl="0">
@@ -13717,7 +13677,7 @@
                 <a:cs typeface="Arial Narrow"/>
                 <a:sym typeface="Arial Narrow"/>
               </a:rPr>
-              <a:t>, Coke, Sprite, Fanta, Ice Tea, etc.</a:t>
+              <a:t>, Coke, Sprite, Fanta, Iced Tea, etc.</a:t>
             </a:r>
             <a:br>
               <a:rPr lang="en-US" sz="5900" dirty="0">
@@ -13798,7 +13758,7 @@
         </p:blipFill>
         <p:spPr>
           <a:xfrm>
-            <a:off x="4054643" y="28064438"/>
+            <a:off x="4054643" y="27787993"/>
             <a:ext cx="2560503" cy="2560503"/>
           </a:xfrm>
           <a:prstGeom prst="rect">
@@ -13818,7 +13778,7 @@
         </p:nvSpPr>
         <p:spPr>
           <a:xfrm>
-            <a:off x="480637" y="30918962"/>
+            <a:off x="480637" y="30642517"/>
             <a:ext cx="9708600" cy="1101900"/>
           </a:xfrm>
           <a:prstGeom prst="rect">
@@ -13942,7 +13902,7 @@
         </p:nvGrpSpPr>
         <p:grpSpPr>
           <a:xfrm>
-            <a:off x="7146392" y="6358263"/>
+            <a:off x="7146392" y="5996758"/>
             <a:ext cx="2930492" cy="1916924"/>
             <a:chOff x="2456527" y="1973910"/>
             <a:chExt cx="799871" cy="523220"/>

</xml_diff>

<commit_message>
Revert " Fix string escaping\
</commit_message>
<xml_diff>
--- a/misc/Menu 24 by 36 on 12-12-24/1_DaBeast Services Menu.pptx
+++ b/misc/Menu 24 by 36 on 12-12-24/1_DaBeast Services Menu.pptx
@@ -21,16 +21,15 @@
       <p:boldItalic r:id="rId7"/>
     </p:embeddedFont>
     <p:embeddedFont>
-      <p:font typeface="Open Sans" panose="020B0604020202020204" charset="0"/>
+      <p:font typeface="Open Sans" panose="020B0606030504020204" pitchFamily="34" charset="0"/>
       <p:regular r:id="rId8"/>
       <p:bold r:id="rId9"/>
-      <p:italic r:id="rId10"/>
-      <p:boldItalic r:id="rId11"/>
+      <p:boldItalic r:id="rId10"/>
     </p:embeddedFont>
     <p:embeddedFont>
       <p:font typeface="Play" panose="020B0604020202020204" charset="0"/>
-      <p:regular r:id="rId12"/>
-      <p:bold r:id="rId13"/>
+      <p:regular r:id="rId11"/>
+      <p:bold r:id="rId12"/>
     </p:embeddedFont>
   </p:embeddedFontLst>
   <p:defaultTextStyle>
@@ -263,11 +262,8 @@
     </a:lvl9pPr>
   </p:defaultTextStyle>
   <p:extLst>
-    <p:ext uri="{EFAFB233-063F-42B5-8137-9DF3F51BA10A}">
-      <p15:sldGuideLst xmlns:p15="http://schemas.microsoft.com/office/powerpoint/2012/main"/>
-    </p:ext>
     <p:ext uri="GoogleSlidesCustomDataVersion2">
-      <go:slidesCustomData xmlns="" xmlns:mc="http://schemas.openxmlformats.org/markup-compatibility/2006" xmlns:mv="urn:schemas-microsoft-com:mac:vml" xmlns:c="http://schemas.openxmlformats.org/drawingml/2006/chart" xmlns:dgm="http://schemas.openxmlformats.org/drawingml/2006/diagram" xmlns:o="urn:schemas-microsoft-com:office:office" xmlns:v="urn:schemas-microsoft-com:vml" xmlns:pvml="urn:schemas-microsoft-com:office:powerpoint" xmlns:com="http://schemas.openxmlformats.org/drawingml/2006/compatibility" xmlns:p14="http://schemas.microsoft.com/office/powerpoint/2010/main" xmlns:p15="http://schemas.microsoft.com/office/powerpoint/2012/main" xmlns:ahyp="http://schemas.microsoft.com/office/drawing/2018/hyperlinkcolor" xmlns:go="http://customooxmlschemas.google.com/" r:id="rId14" roundtripDataSignature="AMtx7mjKFnJc44UMJ+EG8+cMa2aYXiGaoQ=="/>
+      <go:slidesCustomData xmlns:go="http://customooxmlschemas.google.com/" xmlns:ahyp="http://schemas.microsoft.com/office/drawing/2018/hyperlinkcolor" xmlns:p15="http://schemas.microsoft.com/office/powerpoint/2012/main" xmlns:p14="http://schemas.microsoft.com/office/powerpoint/2010/main" xmlns:com="http://schemas.openxmlformats.org/drawingml/2006/compatibility" xmlns:pvml="urn:schemas-microsoft-com:office:powerpoint" xmlns:v="urn:schemas-microsoft-com:vml" xmlns:o="urn:schemas-microsoft-com:office:office" xmlns:dgm="http://schemas.openxmlformats.org/drawingml/2006/diagram" xmlns:c="http://schemas.openxmlformats.org/drawingml/2006/chart" xmlns:mv="urn:schemas-microsoft-com:mac:vml" xmlns:mc="http://schemas.openxmlformats.org/markup-compatibility/2006" xmlns="" r:id="rId14" roundtripDataSignature="AMtx7mjKFnJc44UMJ+EG8+cMa2aYXiGaoQ=="/>
     </p:ext>
   </p:extLst>
 </p:presentation>
@@ -11976,7 +11972,7 @@
         </p:nvSpPr>
         <p:spPr>
           <a:xfrm>
-            <a:off x="11204134" y="13674477"/>
+            <a:off x="11204134" y="14035982"/>
             <a:ext cx="10168200" cy="6698143"/>
           </a:xfrm>
           <a:prstGeom prst="roundRect">
@@ -12127,7 +12123,7 @@
         </p:nvSpPr>
         <p:spPr>
           <a:xfrm>
-            <a:off x="573151" y="5896470"/>
+            <a:off x="573151" y="6257975"/>
             <a:ext cx="10631100" cy="12307500"/>
           </a:xfrm>
           <a:prstGeom prst="rect">
@@ -12327,21 +12323,9 @@
                 <a:cs typeface="Arial Narrow"/>
                 <a:sym typeface="Arial Narrow"/>
               </a:rPr>
-              <a:t>Made from the freshest </a:t>
+              <a:t>Made from the freshest plantains</a:t>
             </a:r>
-            <a:r>
-              <a:rPr lang="en-US" sz="4600" b="1" i="1" u="none" strike="noStrike" cap="none" dirty="0">
-                <a:solidFill>
-                  <a:schemeClr val="lt1"/>
-                </a:solidFill>
-                <a:latin typeface="Arial Narrow"/>
-                <a:ea typeface="Arial Narrow"/>
-                <a:cs typeface="Arial Narrow"/>
-                <a:sym typeface="Arial Narrow"/>
-              </a:rPr>
-              <a:t>plantains</a:t>
-            </a:r>
-            <a:endParaRPr sz="5900" b="1" i="1" u="none" strike="noStrike" cap="none" dirty="0">
+            <a:endParaRPr sz="5900" b="0" i="1" u="none" strike="noStrike" cap="none" dirty="0">
               <a:solidFill>
                 <a:schemeClr val="lt1"/>
               </a:solidFill>
@@ -12505,45 +12489,9 @@
                 <a:cs typeface="Arial Narrow"/>
                 <a:sym typeface="Arial Narrow"/>
               </a:rPr>
-              <a:t>Fried </a:t>
+              <a:t>Fried cheese w/ guava marmalade</a:t>
             </a:r>
-            <a:r>
-              <a:rPr lang="en-US" sz="4600" b="1" i="1" dirty="0">
-                <a:solidFill>
-                  <a:schemeClr val="lt1"/>
-                </a:solidFill>
-                <a:latin typeface="Arial Narrow"/>
-                <a:ea typeface="Arial Narrow"/>
-                <a:cs typeface="Arial Narrow"/>
-                <a:sym typeface="Arial Narrow"/>
-              </a:rPr>
-              <a:t>cheese</a:t>
-            </a:r>
-            <a:r>
-              <a:rPr lang="en-US" sz="4600" i="1" dirty="0">
-                <a:solidFill>
-                  <a:schemeClr val="lt1"/>
-                </a:solidFill>
-                <a:latin typeface="Arial Narrow"/>
-                <a:ea typeface="Arial Narrow"/>
-                <a:cs typeface="Arial Narrow"/>
-                <a:sym typeface="Arial Narrow"/>
-              </a:rPr>
-              <a:t> w/ </a:t>
-            </a:r>
-            <a:r>
-              <a:rPr lang="en-US" sz="4600" b="1" i="1" dirty="0">
-                <a:solidFill>
-                  <a:schemeClr val="lt1"/>
-                </a:solidFill>
-                <a:latin typeface="Arial Narrow"/>
-                <a:ea typeface="Arial Narrow"/>
-                <a:cs typeface="Arial Narrow"/>
-                <a:sym typeface="Arial Narrow"/>
-              </a:rPr>
-              <a:t>guava marmalade</a:t>
-            </a:r>
-            <a:endParaRPr sz="4600" b="1" dirty="0"/>
+            <a:endParaRPr sz="4600" dirty="0"/>
           </a:p>
         </p:txBody>
       </p:sp>
@@ -12555,7 +12503,7 @@
         </p:nvSpPr>
         <p:spPr>
           <a:xfrm>
-            <a:off x="11393984" y="5896485"/>
+            <a:off x="11393984" y="6257990"/>
             <a:ext cx="9859200" cy="15674804"/>
           </a:xfrm>
           <a:prstGeom prst="rect">
@@ -12690,7 +12638,7 @@
               <a:t>	   </a:t>
             </a:r>
             <a:r>
-              <a:rPr lang="en-US" sz="4600" b="1" i="1" dirty="0">
+              <a:rPr lang="en-US" sz="4600" i="1" dirty="0">
                 <a:solidFill>
                   <a:schemeClr val="lt1"/>
                 </a:solidFill>
@@ -12699,57 +12647,9 @@
                 <a:cs typeface="Arial Narrow"/>
                 <a:sym typeface="Arial Narrow"/>
               </a:rPr>
-              <a:t>Rice</a:t>
+              <a:t>Rice, beans w/ smoked chicken</a:t>
             </a:r>
-            <a:r>
-              <a:rPr lang="en-US" sz="4600" i="1" dirty="0">
-                <a:solidFill>
-                  <a:schemeClr val="lt1"/>
-                </a:solidFill>
-                <a:latin typeface="Arial Narrow"/>
-                <a:ea typeface="Arial Narrow"/>
-                <a:cs typeface="Arial Narrow"/>
-                <a:sym typeface="Arial Narrow"/>
-              </a:rPr>
-              <a:t>, </a:t>
-            </a:r>
-            <a:r>
-              <a:rPr lang="en-US" sz="4600" b="1" i="1" dirty="0">
-                <a:solidFill>
-                  <a:schemeClr val="lt1"/>
-                </a:solidFill>
-                <a:latin typeface="Arial Narrow"/>
-                <a:ea typeface="Arial Narrow"/>
-                <a:cs typeface="Arial Narrow"/>
-                <a:sym typeface="Arial Narrow"/>
-              </a:rPr>
-              <a:t>beans</a:t>
-            </a:r>
-            <a:r>
-              <a:rPr lang="en-US" sz="4600" i="1" dirty="0">
-                <a:solidFill>
-                  <a:schemeClr val="lt1"/>
-                </a:solidFill>
-                <a:latin typeface="Arial Narrow"/>
-                <a:ea typeface="Arial Narrow"/>
-                <a:cs typeface="Arial Narrow"/>
-                <a:sym typeface="Arial Narrow"/>
-              </a:rPr>
-              <a:t> w/ </a:t>
-            </a:r>
-            <a:r>
-              <a:rPr lang="en-US" sz="4600" b="1" i="1" dirty="0">
-                <a:solidFill>
-                  <a:schemeClr val="lt1"/>
-                </a:solidFill>
-                <a:latin typeface="Arial Narrow"/>
-                <a:ea typeface="Arial Narrow"/>
-                <a:cs typeface="Arial Narrow"/>
-                <a:sym typeface="Arial Narrow"/>
-              </a:rPr>
-              <a:t>smoked chicken</a:t>
-            </a:r>
-            <a:endParaRPr sz="4600" b="1" i="1" dirty="0"/>
+            <a:endParaRPr sz="4600" i="1" dirty="0"/>
           </a:p>
           <a:p>
             <a:pPr marL="0" marR="0" lvl="0" indent="0" algn="l" rtl="0">
@@ -12847,7 +12747,7 @@
               <a:t>	   </a:t>
             </a:r>
             <a:r>
-              <a:rPr lang="en-US" sz="4600" b="1" i="1" dirty="0">
+              <a:rPr lang="en-US" sz="4600" i="1" dirty="0">
                 <a:solidFill>
                   <a:schemeClr val="lt1"/>
                 </a:solidFill>
@@ -12859,7 +12759,7 @@
               <a:t>Smoked chicken skewers</a:t>
             </a:r>
             <a:r>
-              <a:rPr lang="en-US" sz="4600" b="1" dirty="0">
+              <a:rPr lang="en-US" sz="4600" dirty="0">
                 <a:solidFill>
                   <a:schemeClr val="lt1"/>
                 </a:solidFill>
@@ -12870,7 +12770,7 @@
               </a:rPr>
               <a:t>  </a:t>
             </a:r>
-            <a:endParaRPr sz="4600" b="1" dirty="0"/>
+            <a:endParaRPr sz="4600" dirty="0"/>
           </a:p>
           <a:p>
             <a:pPr marL="0" marR="0" lvl="0" indent="0" algn="l" rtl="0">
@@ -13004,7 +12904,7 @@
               <a:t>Sweet </a:t>
             </a:r>
             <a:r>
-              <a:rPr lang="en-US" sz="4600" b="1" i="1" dirty="0">
+              <a:rPr lang="en-US" sz="4600" i="1" dirty="0" err="1">
                 <a:solidFill>
                   <a:schemeClr val="lt1"/>
                 </a:solidFill>
@@ -13013,9 +12913,9 @@
                 <a:cs typeface="Arial Narrow"/>
                 <a:sym typeface="Arial Narrow"/>
               </a:rPr>
-              <a:t>plantains</a:t>
+              <a:t>plaintains</a:t>
             </a:r>
-            <a:endParaRPr sz="4600" b="1" i="1" dirty="0">
+            <a:endParaRPr sz="4600" i="1" dirty="0">
               <a:solidFill>
                 <a:schemeClr val="lt1"/>
               </a:solidFill>
@@ -13098,21 +12998,9 @@
                 <a:cs typeface="Arial Narrow"/>
                 <a:sym typeface="Arial Narrow"/>
               </a:rPr>
-              <a:t>        Crisped </a:t>
+              <a:t>        Crisped plantains</a:t>
             </a:r>
-            <a:r>
-              <a:rPr lang="en-US" sz="4600" b="1" i="1" u="none" strike="noStrike" cap="none" dirty="0">
-                <a:solidFill>
-                  <a:schemeClr val="lt1"/>
-                </a:solidFill>
-                <a:latin typeface="Arial Narrow"/>
-                <a:ea typeface="Arial Narrow"/>
-                <a:cs typeface="Arial Narrow"/>
-                <a:sym typeface="Arial Narrow"/>
-              </a:rPr>
-              <a:t>plantains</a:t>
-            </a:r>
-            <a:endParaRPr lang="en-US" sz="4600" b="1" i="0" u="none" strike="noStrike" cap="none" dirty="0">
+            <a:endParaRPr lang="en-US" sz="4600" b="0" i="0" u="none" strike="noStrike" cap="none" dirty="0">
               <a:solidFill>
                 <a:schemeClr val="lt1"/>
               </a:solidFill>
@@ -13272,8 +13160,8 @@
         </p:nvSpPr>
         <p:spPr>
           <a:xfrm>
-            <a:off x="982914" y="20325056"/>
-            <a:ext cx="10221000" cy="6656951"/>
+            <a:off x="982914" y="20452646"/>
+            <a:ext cx="10221000" cy="7366500"/>
           </a:xfrm>
           <a:prstGeom prst="rect">
             <a:avLst/>
@@ -13299,7 +13187,7 @@
               <a:buNone/>
             </a:pPr>
             <a:r>
-              <a:rPr lang="en-US" sz="11800" b="1" dirty="0">
+              <a:rPr lang="en-US" sz="11800" b="1">
                 <a:solidFill>
                   <a:schemeClr val="lt1"/>
                 </a:solidFill>
@@ -13310,7 +13198,27 @@
               </a:rPr>
               <a:t>Desserts</a:t>
             </a:r>
-            <a:endParaRPr sz="7800" b="1" dirty="0">
+            <a:endParaRPr sz="7800" b="1">
+              <a:solidFill>
+                <a:schemeClr val="lt1"/>
+              </a:solidFill>
+              <a:latin typeface="Arial Narrow"/>
+              <a:ea typeface="Arial Narrow"/>
+              <a:cs typeface="Arial Narrow"/>
+              <a:sym typeface="Arial Narrow"/>
+            </a:endParaRPr>
+          </a:p>
+          <a:p>
+            <a:pPr marL="0" marR="0" lvl="0" indent="0" algn="l" rtl="0">
+              <a:spcBef>
+                <a:spcPts val="0"/>
+              </a:spcBef>
+              <a:spcAft>
+                <a:spcPts val="0"/>
+              </a:spcAft>
+              <a:buNone/>
+            </a:pPr>
+            <a:endParaRPr sz="4600">
               <a:solidFill>
                 <a:schemeClr val="lt1"/>
               </a:solidFill>
@@ -13335,7 +13243,7 @@
               <a:buFont typeface="Arial"/>
               <a:buNone/>
             </a:pPr>
-            <a:endParaRPr sz="5900" dirty="0">
+            <a:endParaRPr sz="5900">
               <a:solidFill>
                 <a:schemeClr val="lt1"/>
               </a:solidFill>
@@ -13361,7 +13269,7 @@
               <a:buChar char="•"/>
             </a:pPr>
             <a:r>
-              <a:rPr lang="en-US" sz="5900" dirty="0">
+              <a:rPr lang="en-US" sz="5900">
                 <a:solidFill>
                   <a:schemeClr val="lt1"/>
                 </a:solidFill>
@@ -13373,7 +13281,7 @@
               <a:t>Fried Oreos ……………….. </a:t>
             </a:r>
             <a:r>
-              <a:rPr lang="en-US" sz="5900" b="1" dirty="0">
+              <a:rPr lang="en-US" sz="5900" b="1">
                 <a:solidFill>
                   <a:srgbClr val="8CD872"/>
                 </a:solidFill>
@@ -13384,7 +13292,7 @@
               </a:rPr>
               <a:t>5</a:t>
             </a:r>
-            <a:endParaRPr sz="4600" dirty="0"/>
+            <a:endParaRPr sz="4600"/>
           </a:p>
           <a:p>
             <a:pPr marL="927100" marR="0" lvl="0" indent="-933450" algn="l" rtl="0">
@@ -13402,7 +13310,7 @@
               <a:buChar char="•"/>
             </a:pPr>
             <a:r>
-              <a:rPr lang="en-US" sz="5900" dirty="0">
+              <a:rPr lang="en-US" sz="5900">
                 <a:solidFill>
                   <a:schemeClr val="lt1"/>
                 </a:solidFill>
@@ -13411,33 +13319,21 @@
                 <a:cs typeface="Arial Narrow"/>
                 <a:sym typeface="Arial Narrow"/>
               </a:rPr>
-              <a:t>Fried Cheesecake Bites </a:t>
+              <a:t>Fried Cheesecake Bites …. </a:t>
             </a:r>
             <a:r>
-              <a:rPr lang="en-US" sz="5900">
-                <a:solidFill>
-                  <a:schemeClr val="lt1"/>
+              <a:rPr lang="en-US" sz="5900" b="1">
+                <a:solidFill>
+                  <a:srgbClr val="8CD872"/>
                 </a:solidFill>
                 <a:latin typeface="Arial Narrow"/>
                 <a:ea typeface="Arial Narrow"/>
                 <a:cs typeface="Arial Narrow"/>
                 <a:sym typeface="Arial Narrow"/>
               </a:rPr>
-              <a:t>…. </a:t>
+              <a:t>6</a:t>
             </a:r>
-            <a:r>
-              <a:rPr lang="en-US" sz="5900" b="1">
-                <a:solidFill>
-                  <a:srgbClr val="8CD872"/>
-                </a:solidFill>
-                <a:latin typeface="Arial Narrow"/>
-                <a:ea typeface="Arial Narrow"/>
-                <a:cs typeface="Arial Narrow"/>
-                <a:sym typeface="Arial Narrow"/>
-              </a:rPr>
-              <a:t>7</a:t>
-            </a:r>
-            <a:endParaRPr sz="4600" dirty="0"/>
+            <a:endParaRPr sz="4600"/>
           </a:p>
           <a:p>
             <a:pPr marL="927100" marR="0" lvl="0" indent="-933450" algn="l" rtl="0">
@@ -13455,7 +13351,7 @@
               <a:buChar char="•"/>
             </a:pPr>
             <a:r>
-              <a:rPr lang="en-US" sz="5900" dirty="0">
+              <a:rPr lang="en-US" sz="5900">
                 <a:solidFill>
                   <a:schemeClr val="lt1"/>
                 </a:solidFill>
@@ -13467,7 +13363,7 @@
               <a:t>Limber De Coco (Ice Cream) …………………………….… </a:t>
             </a:r>
             <a:r>
-              <a:rPr lang="en-US" sz="5900" b="1" dirty="0">
+              <a:rPr lang="en-US" sz="5900" b="1">
                 <a:solidFill>
                   <a:srgbClr val="8CD872"/>
                 </a:solidFill>
@@ -13478,7 +13374,7 @@
               </a:rPr>
               <a:t>5</a:t>
             </a:r>
-            <a:endParaRPr sz="4600" b="1" dirty="0">
+            <a:endParaRPr sz="4600" b="1">
               <a:solidFill>
                 <a:srgbClr val="8CD872"/>
               </a:solidFill>
@@ -13494,7 +13390,7 @@
         </p:nvCxnSpPr>
         <p:spPr>
           <a:xfrm>
-            <a:off x="497853" y="8161388"/>
+            <a:off x="497853" y="8522893"/>
             <a:ext cx="20755200" cy="0"/>
           </a:xfrm>
           <a:prstGeom prst="straightConnector1">
@@ -13520,7 +13416,7 @@
         </p:nvCxnSpPr>
         <p:spPr>
           <a:xfrm>
-            <a:off x="497853" y="22423555"/>
+            <a:off x="497853" y="22785060"/>
             <a:ext cx="20755200" cy="0"/>
           </a:xfrm>
           <a:prstGeom prst="straightConnector1">
@@ -13546,8 +13442,8 @@
         </p:nvSpPr>
         <p:spPr>
           <a:xfrm>
-            <a:off x="11416931" y="20325037"/>
-            <a:ext cx="9859200" cy="10396436"/>
+            <a:off x="11416931" y="20452627"/>
+            <a:ext cx="9859200" cy="9888604"/>
           </a:xfrm>
           <a:prstGeom prst="rect">
             <a:avLst/>
@@ -13585,6 +13481,26 @@
               <a:t>Beverages</a:t>
             </a:r>
             <a:endParaRPr sz="4600" dirty="0"/>
+          </a:p>
+          <a:p>
+            <a:pPr marL="0" marR="0" lvl="0" indent="0" algn="l" rtl="0">
+              <a:spcBef>
+                <a:spcPts val="0"/>
+              </a:spcBef>
+              <a:spcAft>
+                <a:spcPts val="0"/>
+              </a:spcAft>
+              <a:buNone/>
+            </a:pPr>
+            <a:endParaRPr sz="5900" dirty="0">
+              <a:solidFill>
+                <a:schemeClr val="lt1"/>
+              </a:solidFill>
+              <a:latin typeface="Arial Narrow"/>
+              <a:ea typeface="Arial Narrow"/>
+              <a:cs typeface="Arial Narrow"/>
+              <a:sym typeface="Arial Narrow"/>
+            </a:endParaRPr>
           </a:p>
           <a:p>
             <a:pPr marL="0" marR="0" lvl="0" indent="0" algn="l" rtl="0">
@@ -13745,35 +13661,6 @@
                 <a:sym typeface="Arial Narrow"/>
               </a:rPr>
               <a:t>3</a:t>
-            </a:r>
-            <a:endParaRPr lang="en-US" sz="4600" dirty="0"/>
-          </a:p>
-          <a:p>
-            <a:pPr marL="2984500" marR="0" lvl="1" indent="-1041400" algn="l" rtl="0">
-              <a:spcBef>
-                <a:spcPts val="0"/>
-              </a:spcBef>
-              <a:spcAft>
-                <a:spcPts val="0"/>
-              </a:spcAft>
-              <a:buClr>
-                <a:schemeClr val="lt1"/>
-              </a:buClr>
-              <a:buSzPts val="4600"/>
-              <a:buFont typeface="Arial Narrow"/>
-              <a:buChar char="○"/>
-            </a:pPr>
-            <a:r>
-              <a:rPr lang="en-US" sz="4600" i="1" dirty="0">
-                <a:solidFill>
-                  <a:schemeClr val="lt1"/>
-                </a:solidFill>
-                <a:latin typeface="Arial Narrow"/>
-                <a:ea typeface="Arial Narrow"/>
-                <a:cs typeface="Arial Narrow"/>
-                <a:sym typeface="Arial Narrow"/>
-              </a:rPr>
-              <a:t>Gatorade, Red Bull, Coke, Sprite, Fanta, Iced Tea, etc.</a:t>
             </a:r>
             <a:br>
               <a:rPr lang="en-US" sz="5900" dirty="0">
@@ -13854,7 +13741,7 @@
         </p:blipFill>
         <p:spPr>
           <a:xfrm>
-            <a:off x="4054643" y="27787993"/>
+            <a:off x="4054643" y="28064438"/>
             <a:ext cx="2560503" cy="2560503"/>
           </a:xfrm>
           <a:prstGeom prst="rect">
@@ -13874,7 +13761,7 @@
         </p:nvSpPr>
         <p:spPr>
           <a:xfrm>
-            <a:off x="480637" y="30642517"/>
+            <a:off x="480637" y="30918962"/>
             <a:ext cx="9708600" cy="1101900"/>
           </a:xfrm>
           <a:prstGeom prst="rect">
@@ -13998,7 +13885,7 @@
         </p:nvGrpSpPr>
         <p:grpSpPr>
           <a:xfrm>
-            <a:off x="7146392" y="5996758"/>
+            <a:off x="7146392" y="6358263"/>
             <a:ext cx="2930492" cy="1916924"/>
             <a:chOff x="2456527" y="1973910"/>
             <a:chExt cx="799871" cy="523220"/>

</xml_diff>